<commit_message>
Final draft of intro slides and ML slides
</commit_message>
<xml_diff>
--- a/Workshop/Content/4. Machine Learning/Azure Machine Learning.pptx
+++ b/Workshop/Content/4. Machine Learning/Azure Machine Learning.pptx
@@ -211,7 +211,7 @@
           <a:p>
             <a:fld id="{49B60EF2-7028-489F-85D8-FE86CD7CF2A0}" type="datetimeFigureOut">
               <a:rPr lang="en-US" smtClean="0"/>
-              <a:t>6/21/2016</a:t>
+              <a:t>6/22/2016</a:t>
             </a:fld>
             <a:endParaRPr lang="en-US"/>
           </a:p>
@@ -723,6 +723,106 @@
           <a:bodyPr/>
           <a:lstStyle/>
           <a:p>
+            <a:r>
+              <a:rPr lang="en-US" dirty="0" smtClean="0"/>
+              <a:t>Once deployed as a Web service, a model can be used</a:t>
+            </a:r>
+            <a:r>
+              <a:rPr lang="en-US" baseline="0" dirty="0" smtClean="0"/>
+              <a:t> with simple REST calls over HTTP. This enables developers to build "smart apps" that get their intelligence from ML. In the next lab, students will build and train an ML model, deploy it as a Web service, and then write a client app that uses it.</a:t>
+            </a:r>
+            <a:endParaRPr lang="en-US" dirty="0"/>
+          </a:p>
+        </p:txBody>
+      </p:sp>
+      <p:sp>
+        <p:nvSpPr>
+          <p:cNvPr id="4" name="Slide Number Placeholder 3"/>
+          <p:cNvSpPr>
+            <a:spLocks noGrp="1"/>
+          </p:cNvSpPr>
+          <p:nvPr>
+            <p:ph type="sldNum" sz="quarter" idx="10"/>
+          </p:nvPr>
+        </p:nvSpPr>
+        <p:spPr/>
+        <p:txBody>
+          <a:bodyPr/>
+          <a:lstStyle/>
+          <a:p>
+            <a:fld id="{01283FAC-A721-45A3-BBDE-EAF2B09B7CD9}" type="slidenum">
+              <a:rPr lang="en-US" smtClean="0"/>
+              <a:t>11</a:t>
+            </a:fld>
+            <a:endParaRPr lang="en-US"/>
+          </a:p>
+        </p:txBody>
+      </p:sp>
+    </p:spTree>
+    <p:extLst>
+      <p:ext uri="{BB962C8B-B14F-4D97-AF65-F5344CB8AC3E}">
+        <p14:creationId xmlns:p14="http://schemas.microsoft.com/office/powerpoint/2010/main" val="1999800174"/>
+      </p:ext>
+    </p:extLst>
+  </p:cSld>
+  <p:clrMapOvr>
+    <a:masterClrMapping/>
+  </p:clrMapOvr>
+</p:notes>
+</file>
+
+<file path=ppt/notesSlides/notesSlide12.xml><?xml version="1.0" encoding="utf-8"?>
+<p:notes xmlns:a="http://schemas.openxmlformats.org/drawingml/2006/main" xmlns:r="http://schemas.openxmlformats.org/officeDocument/2006/relationships" xmlns:p="http://schemas.openxmlformats.org/presentationml/2006/main">
+  <p:cSld>
+    <p:spTree>
+      <p:nvGrpSpPr>
+        <p:cNvPr id="1" name=""/>
+        <p:cNvGrpSpPr/>
+        <p:nvPr/>
+      </p:nvGrpSpPr>
+      <p:grpSpPr>
+        <a:xfrm>
+          <a:off x="0" y="0"/>
+          <a:ext cx="0" cy="0"/>
+          <a:chOff x="0" y="0"/>
+          <a:chExt cx="0" cy="0"/>
+        </a:xfrm>
+      </p:grpSpPr>
+      <p:sp>
+        <p:nvSpPr>
+          <p:cNvPr id="2" name="Slide Image Placeholder 1"/>
+          <p:cNvSpPr>
+            <a:spLocks noGrp="1" noRot="1" noChangeAspect="1"/>
+          </p:cNvSpPr>
+          <p:nvPr>
+            <p:ph type="sldImg"/>
+          </p:nvPr>
+        </p:nvSpPr>
+        <p:spPr/>
+      </p:sp>
+      <p:sp>
+        <p:nvSpPr>
+          <p:cNvPr id="3" name="Notes Placeholder 2"/>
+          <p:cNvSpPr>
+            <a:spLocks noGrp="1"/>
+          </p:cNvSpPr>
+          <p:nvPr>
+            <p:ph type="body" idx="1"/>
+          </p:nvPr>
+        </p:nvSpPr>
+        <p:spPr/>
+        <p:txBody>
+          <a:bodyPr/>
+          <a:lstStyle/>
+          <a:p>
+            <a:r>
+              <a:rPr lang="en-US" dirty="0" smtClean="0"/>
+              <a:t>Good book -- and free!</a:t>
+            </a:r>
+            <a:r>
+              <a:rPr lang="en-US" baseline="0" dirty="0" smtClean="0"/>
+              <a:t> Another recommended book on Azure Machine is Learning is "Predictive Analytics with Microsoft Azure Machine Learning " (https://www.amazon.com/Predictive-Analytics-Microsoft-Machine-Learning/dp/1484212010).</a:t>
+            </a:r>
             <a:endParaRPr lang="en-US" dirty="0"/>
           </a:p>
         </p:txBody>
@@ -1397,7 +1497,15 @@
             </a:r>
             <a:r>
               <a:rPr lang="en-US" baseline="0" dirty="0" smtClean="0"/>
-              <a:t> it is used, and ML Studio includes modules to help with the cleaning. Once the data is ready, you select an algorithm and "train" the model by allowing it to iterate over the data and find patterns in it. After that comes scoring and evaluating the model, which tells you how well the model is able to predict outcomes. All of this is performed visually in ML Studio. Once the model is ready, a few button clicks deploy it as a Web service so it can be called from client apps.</a:t>
+              <a:t> it is used, and ML Studio includes modules to help with the cleaning. </a:t>
+            </a:r>
+            <a:r>
+              <a:rPr lang="en-US" baseline="0" dirty="0" smtClean="0"/>
+              <a:t>(Examples of cleaning include removing rows with missing data, replacing missing data algorithmically, removing duplicate rows, and removing rows containing "outliers." In practice, cleaning the data can be very time-intensive and often consumes 50% of the time required to build the model.) Once </a:t>
+            </a:r>
+            <a:r>
+              <a:rPr lang="en-US" baseline="0" dirty="0" smtClean="0"/>
+              <a:t>the data is ready, you select an algorithm and "train" the model by allowing it to iterate over the data and find patterns in it. After that comes scoring and evaluating the model, which tells you how well the model is able to predict outcomes. All of this is performed visually in ML Studio. Once the model is ready, a few button clicks deploy it as a Web service so it can be called from client apps.</a:t>
             </a:r>
             <a:endParaRPr lang="en-US" dirty="0"/>
           </a:p>
@@ -1630,8 +1738,29 @@
                 <a:ea typeface="+mn-ea"/>
                 <a:cs typeface="+mn-cs"/>
               </a:rPr>
-              <a:t>Clustering seeks to group a set of objects in such a way that objects in the same group (called a cluster) are more similar to each other than to those in other groups (clusters). </a:t>
-            </a:r>
+              <a:t>Clustering seeks to group a set of objects in such a way that objects in the same group (called a cluster) are more similar to each other than to those in other groups (clusters</a:t>
+            </a:r>
+            <a:r>
+              <a:rPr lang="en-US" sz="1200" kern="1200" dirty="0" smtClean="0">
+                <a:solidFill>
+                  <a:schemeClr val="tx1"/>
+                </a:solidFill>
+                <a:effectLst/>
+                <a:latin typeface="+mn-lt"/>
+                <a:ea typeface="+mn-ea"/>
+                <a:cs typeface="+mn-cs"/>
+              </a:rPr>
+              <a:t>).</a:t>
+            </a:r>
+            <a:endParaRPr lang="en-US" sz="1200" kern="1200" dirty="0" smtClean="0">
+              <a:solidFill>
+                <a:schemeClr val="tx1"/>
+              </a:solidFill>
+              <a:effectLst/>
+              <a:latin typeface="+mn-lt"/>
+              <a:ea typeface="+mn-ea"/>
+              <a:cs typeface="+mn-cs"/>
+            </a:endParaRPr>
           </a:p>
           <a:p>
             <a:endParaRPr lang="en-US" dirty="0" smtClean="0"/>
@@ -1724,7 +1853,24 @@
             </a:r>
             <a:r>
               <a:rPr lang="en-US" baseline="0" dirty="0" smtClean="0"/>
-              <a:t> techniques are used to best-fit a line (hence, LINEAR regression) to the data. Training a linear regression model with millions of values can take time, but once the model is trained, using it to perform predictive analysis is fast because "running" the model involves little more than solving an equation whose coefficients have already been computed (during training).</a:t>
+              <a:t> techniques are used to best-fit a line (hence, LINEAR regression) to the </a:t>
+            </a:r>
+            <a:r>
+              <a:rPr lang="en-US" baseline="0" dirty="0" smtClean="0"/>
+              <a:t>data. Multivariate linear regression is similar, but adds additional terms to the equation (b2, b3, and so on).</a:t>
+            </a:r>
+          </a:p>
+          <a:p>
+            <a:endParaRPr lang="en-US" baseline="0" dirty="0" smtClean="0"/>
+          </a:p>
+          <a:p>
+            <a:r>
+              <a:rPr lang="en-US" baseline="0" dirty="0" smtClean="0"/>
+              <a:t>Training </a:t>
+            </a:r>
+            <a:r>
+              <a:rPr lang="en-US" baseline="0" dirty="0" smtClean="0"/>
+              <a:t>a linear regression model with millions of values can take time, but once the model is trained, using it to perform predictive analysis is fast because "running" the model involves little more than solving an equation whose coefficients have already been computed (during training).</a:t>
             </a:r>
             <a:br>
               <a:rPr lang="en-US" baseline="0" dirty="0" smtClean="0"/>
@@ -1927,7 +2073,7 @@
           <a:p>
             <a:fld id="{0459C166-16D3-4A25-A2F8-C51E0E346B22}" type="datetimeFigureOut">
               <a:rPr lang="en-US" smtClean="0"/>
-              <a:t>6/21/2016</a:t>
+              <a:t>6/22/2016</a:t>
             </a:fld>
             <a:endParaRPr lang="en-US"/>
           </a:p>
@@ -2022,7 +2168,7 @@
           <a:p>
             <a:fld id="{0459C166-16D3-4A25-A2F8-C51E0E346B22}" type="datetimeFigureOut">
               <a:rPr lang="en-US" smtClean="0"/>
-              <a:t>6/21/2016</a:t>
+              <a:t>6/22/2016</a:t>
             </a:fld>
             <a:endParaRPr lang="en-US"/>
           </a:p>
@@ -2297,7 +2443,7 @@
           <a:p>
             <a:fld id="{0459C166-16D3-4A25-A2F8-C51E0E346B22}" type="datetimeFigureOut">
               <a:rPr lang="en-US" smtClean="0"/>
-              <a:t>6/21/2016</a:t>
+              <a:t>6/22/2016</a:t>
             </a:fld>
             <a:endParaRPr lang="en-US"/>
           </a:p>
@@ -2549,7 +2695,7 @@
           <a:p>
             <a:fld id="{0459C166-16D3-4A25-A2F8-C51E0E346B22}" type="datetimeFigureOut">
               <a:rPr lang="en-US" smtClean="0"/>
-              <a:t>6/21/2016</a:t>
+              <a:t>6/22/2016</a:t>
             </a:fld>
             <a:endParaRPr lang="en-US"/>
           </a:p>
@@ -2717,7 +2863,7 @@
           <a:p>
             <a:fld id="{0459C166-16D3-4A25-A2F8-C51E0E346B22}" type="datetimeFigureOut">
               <a:rPr lang="en-US" smtClean="0"/>
-              <a:t>6/21/2016</a:t>
+              <a:t>6/22/2016</a:t>
             </a:fld>
             <a:endParaRPr lang="en-US"/>
           </a:p>
@@ -2895,7 +3041,7 @@
           <a:p>
             <a:fld id="{0459C166-16D3-4A25-A2F8-C51E0E346B22}" type="datetimeFigureOut">
               <a:rPr lang="en-US" smtClean="0"/>
-              <a:t>6/21/2016</a:t>
+              <a:t>6/22/2016</a:t>
             </a:fld>
             <a:endParaRPr lang="en-US"/>
           </a:p>
@@ -4822,7 +4968,7 @@
           <a:p>
             <a:fld id="{0459C166-16D3-4A25-A2F8-C51E0E346B22}" type="datetimeFigureOut">
               <a:rPr lang="en-US" smtClean="0"/>
-              <a:t>6/21/2016</a:t>
+              <a:t>6/22/2016</a:t>
             </a:fld>
             <a:endParaRPr lang="en-US"/>
           </a:p>
@@ -10449,7 +10595,7 @@
             <a:fld id="{0459C166-16D3-4A25-A2F8-C51E0E346B22}" type="datetimeFigureOut">
               <a:rPr lang="en-US" smtClean="0"/>
               <a:pPr/>
-              <a:t>6/21/2016</a:t>
+              <a:t>6/22/2016</a:t>
             </a:fld>
             <a:endParaRPr lang="en-US"/>
           </a:p>
@@ -14511,7 +14657,7 @@
           <a:p>
             <a:fld id="{0459C166-16D3-4A25-A2F8-C51E0E346B22}" type="datetimeFigureOut">
               <a:rPr lang="en-US" smtClean="0"/>
-              <a:t>6/21/2016</a:t>
+              <a:t>6/22/2016</a:t>
             </a:fld>
             <a:endParaRPr lang="en-US"/>
           </a:p>
@@ -14875,7 +15021,7 @@
           <a:p>
             <a:fld id="{0459C166-16D3-4A25-A2F8-C51E0E346B22}" type="datetimeFigureOut">
               <a:rPr lang="en-US" smtClean="0"/>
-              <a:t>6/21/2016</a:t>
+              <a:t>6/22/2016</a:t>
             </a:fld>
             <a:endParaRPr lang="en-US"/>
           </a:p>
@@ -14992,7 +15138,7 @@
           <a:p>
             <a:fld id="{0459C166-16D3-4A25-A2F8-C51E0E346B22}" type="datetimeFigureOut">
               <a:rPr lang="en-US" smtClean="0"/>
-              <a:t>6/21/2016</a:t>
+              <a:t>6/22/2016</a:t>
             </a:fld>
             <a:endParaRPr lang="en-US"/>
           </a:p>
@@ -15203,7 +15349,7 @@
           <a:p>
             <a:fld id="{0459C166-16D3-4A25-A2F8-C51E0E346B22}" type="datetimeFigureOut">
               <a:rPr lang="en-US" smtClean="0"/>
-              <a:t>6/21/2016</a:t>
+              <a:t>6/22/2016</a:t>
             </a:fld>
             <a:endParaRPr lang="en-US"/>
           </a:p>
@@ -16761,7 +16907,7 @@
           <p:nvPr/>
         </p:nvPicPr>
         <p:blipFill>
-          <a:blip r:embed="rId2"/>
+          <a:blip r:embed="rId3"/>
           <a:stretch>
             <a:fillRect/>
           </a:stretch>

</xml_diff>